<commit_message>
Remove debugging print statements
Upate CRC Cards
</commit_message>
<xml_diff>
--- a/Group31-a1/01/skizze_exercise_01_1.pptx
+++ b/Group31-a1/01/skizze_exercise_01_1.pptx
@@ -2506,7 +2506,7 @@
           <a:p>
             <a:fld id="{BEEA9843-67A4-478B-AB46-C4B6911EBF4B}" type="datetimeFigureOut">
               <a:rPr lang="de-CH" smtClean="0"/>
-              <a:t>04.11.2022</a:t>
+              <a:t>05.11.22</a:t>
             </a:fld>
             <a:endParaRPr lang="de-CH"/>
           </a:p>
@@ -2560,7 +2560,7 @@
           <a:p>
             <a:fld id="{816734B5-DD38-414A-A8B5-7263E2A56A00}" type="slidenum">
               <a:rPr lang="de-CH" smtClean="0"/>
-              <a:t>‹Nr.›</a:t>
+              <a:t>‹#›</a:t>
             </a:fld>
             <a:endParaRPr lang="de-CH"/>
           </a:p>
@@ -2706,7 +2706,7 @@
           <a:p>
             <a:fld id="{BEEA9843-67A4-478B-AB46-C4B6911EBF4B}" type="datetimeFigureOut">
               <a:rPr lang="de-CH" smtClean="0"/>
-              <a:t>04.11.2022</a:t>
+              <a:t>05.11.22</a:t>
             </a:fld>
             <a:endParaRPr lang="de-CH"/>
           </a:p>
@@ -2760,7 +2760,7 @@
           <a:p>
             <a:fld id="{816734B5-DD38-414A-A8B5-7263E2A56A00}" type="slidenum">
               <a:rPr lang="de-CH" smtClean="0"/>
-              <a:t>‹Nr.›</a:t>
+              <a:t>‹#›</a:t>
             </a:fld>
             <a:endParaRPr lang="de-CH"/>
           </a:p>
@@ -2916,7 +2916,7 @@
           <a:p>
             <a:fld id="{BEEA9843-67A4-478B-AB46-C4B6911EBF4B}" type="datetimeFigureOut">
               <a:rPr lang="de-CH" smtClean="0"/>
-              <a:t>04.11.2022</a:t>
+              <a:t>05.11.22</a:t>
             </a:fld>
             <a:endParaRPr lang="de-CH"/>
           </a:p>
@@ -2970,7 +2970,7 @@
           <a:p>
             <a:fld id="{816734B5-DD38-414A-A8B5-7263E2A56A00}" type="slidenum">
               <a:rPr lang="de-CH" smtClean="0"/>
-              <a:t>‹Nr.›</a:t>
+              <a:t>‹#›</a:t>
             </a:fld>
             <a:endParaRPr lang="de-CH"/>
           </a:p>
@@ -3116,7 +3116,7 @@
           <a:p>
             <a:fld id="{BEEA9843-67A4-478B-AB46-C4B6911EBF4B}" type="datetimeFigureOut">
               <a:rPr lang="de-CH" smtClean="0"/>
-              <a:t>04.11.2022</a:t>
+              <a:t>05.11.22</a:t>
             </a:fld>
             <a:endParaRPr lang="de-CH"/>
           </a:p>
@@ -3170,7 +3170,7 @@
           <a:p>
             <a:fld id="{816734B5-DD38-414A-A8B5-7263E2A56A00}" type="slidenum">
               <a:rPr lang="de-CH" smtClean="0"/>
-              <a:t>‹Nr.›</a:t>
+              <a:t>‹#›</a:t>
             </a:fld>
             <a:endParaRPr lang="de-CH"/>
           </a:p>
@@ -3392,7 +3392,7 @@
           <a:p>
             <a:fld id="{BEEA9843-67A4-478B-AB46-C4B6911EBF4B}" type="datetimeFigureOut">
               <a:rPr lang="de-CH" smtClean="0"/>
-              <a:t>04.11.2022</a:t>
+              <a:t>05.11.22</a:t>
             </a:fld>
             <a:endParaRPr lang="de-CH"/>
           </a:p>
@@ -3446,7 +3446,7 @@
           <a:p>
             <a:fld id="{816734B5-DD38-414A-A8B5-7263E2A56A00}" type="slidenum">
               <a:rPr lang="de-CH" smtClean="0"/>
-              <a:t>‹Nr.›</a:t>
+              <a:t>‹#›</a:t>
             </a:fld>
             <a:endParaRPr lang="de-CH"/>
           </a:p>
@@ -3660,7 +3660,7 @@
           <a:p>
             <a:fld id="{BEEA9843-67A4-478B-AB46-C4B6911EBF4B}" type="datetimeFigureOut">
               <a:rPr lang="de-CH" smtClean="0"/>
-              <a:t>04.11.2022</a:t>
+              <a:t>05.11.22</a:t>
             </a:fld>
             <a:endParaRPr lang="de-CH"/>
           </a:p>
@@ -3714,7 +3714,7 @@
           <a:p>
             <a:fld id="{816734B5-DD38-414A-A8B5-7263E2A56A00}" type="slidenum">
               <a:rPr lang="de-CH" smtClean="0"/>
-              <a:t>‹Nr.›</a:t>
+              <a:t>‹#›</a:t>
             </a:fld>
             <a:endParaRPr lang="de-CH"/>
           </a:p>
@@ -4075,7 +4075,7 @@
           <a:p>
             <a:fld id="{BEEA9843-67A4-478B-AB46-C4B6911EBF4B}" type="datetimeFigureOut">
               <a:rPr lang="de-CH" smtClean="0"/>
-              <a:t>04.11.2022</a:t>
+              <a:t>05.11.22</a:t>
             </a:fld>
             <a:endParaRPr lang="de-CH"/>
           </a:p>
@@ -4129,7 +4129,7 @@
           <a:p>
             <a:fld id="{816734B5-DD38-414A-A8B5-7263E2A56A00}" type="slidenum">
               <a:rPr lang="de-CH" smtClean="0"/>
-              <a:t>‹Nr.›</a:t>
+              <a:t>‹#›</a:t>
             </a:fld>
             <a:endParaRPr lang="de-CH"/>
           </a:p>
@@ -4217,7 +4217,7 @@
           <a:p>
             <a:fld id="{BEEA9843-67A4-478B-AB46-C4B6911EBF4B}" type="datetimeFigureOut">
               <a:rPr lang="de-CH" smtClean="0"/>
-              <a:t>04.11.2022</a:t>
+              <a:t>05.11.22</a:t>
             </a:fld>
             <a:endParaRPr lang="de-CH"/>
           </a:p>
@@ -4271,7 +4271,7 @@
           <a:p>
             <a:fld id="{816734B5-DD38-414A-A8B5-7263E2A56A00}" type="slidenum">
               <a:rPr lang="de-CH" smtClean="0"/>
-              <a:t>‹Nr.›</a:t>
+              <a:t>‹#›</a:t>
             </a:fld>
             <a:endParaRPr lang="de-CH"/>
           </a:p>
@@ -4330,7 +4330,7 @@
           <a:p>
             <a:fld id="{BEEA9843-67A4-478B-AB46-C4B6911EBF4B}" type="datetimeFigureOut">
               <a:rPr lang="de-CH" smtClean="0"/>
-              <a:t>04.11.2022</a:t>
+              <a:t>05.11.22</a:t>
             </a:fld>
             <a:endParaRPr lang="de-CH"/>
           </a:p>
@@ -4384,7 +4384,7 @@
           <a:p>
             <a:fld id="{816734B5-DD38-414A-A8B5-7263E2A56A00}" type="slidenum">
               <a:rPr lang="de-CH" smtClean="0"/>
-              <a:t>‹Nr.›</a:t>
+              <a:t>‹#›</a:t>
             </a:fld>
             <a:endParaRPr lang="de-CH"/>
           </a:p>
@@ -4643,7 +4643,7 @@
           <a:p>
             <a:fld id="{BEEA9843-67A4-478B-AB46-C4B6911EBF4B}" type="datetimeFigureOut">
               <a:rPr lang="de-CH" smtClean="0"/>
-              <a:t>04.11.2022</a:t>
+              <a:t>05.11.22</a:t>
             </a:fld>
             <a:endParaRPr lang="de-CH"/>
           </a:p>
@@ -4697,7 +4697,7 @@
           <a:p>
             <a:fld id="{816734B5-DD38-414A-A8B5-7263E2A56A00}" type="slidenum">
               <a:rPr lang="de-CH" smtClean="0"/>
-              <a:t>‹Nr.›</a:t>
+              <a:t>‹#›</a:t>
             </a:fld>
             <a:endParaRPr lang="de-CH"/>
           </a:p>
@@ -4932,7 +4932,7 @@
           <a:p>
             <a:fld id="{BEEA9843-67A4-478B-AB46-C4B6911EBF4B}" type="datetimeFigureOut">
               <a:rPr lang="de-CH" smtClean="0"/>
-              <a:t>04.11.2022</a:t>
+              <a:t>05.11.22</a:t>
             </a:fld>
             <a:endParaRPr lang="de-CH"/>
           </a:p>
@@ -4986,7 +4986,7 @@
           <a:p>
             <a:fld id="{816734B5-DD38-414A-A8B5-7263E2A56A00}" type="slidenum">
               <a:rPr lang="de-CH" smtClean="0"/>
-              <a:t>‹Nr.›</a:t>
+              <a:t>‹#›</a:t>
             </a:fld>
             <a:endParaRPr lang="de-CH"/>
           </a:p>
@@ -5175,7 +5175,7 @@
           <a:p>
             <a:fld id="{BEEA9843-67A4-478B-AB46-C4B6911EBF4B}" type="datetimeFigureOut">
               <a:rPr lang="de-CH" smtClean="0"/>
-              <a:t>04.11.2022</a:t>
+              <a:t>05.11.22</a:t>
             </a:fld>
             <a:endParaRPr lang="de-CH"/>
           </a:p>
@@ -5265,7 +5265,7 @@
           <a:p>
             <a:fld id="{816734B5-DD38-414A-A8B5-7263E2A56A00}" type="slidenum">
               <a:rPr lang="de-CH" smtClean="0"/>
-              <a:t>‹Nr.›</a:t>
+              <a:t>‹#›</a:t>
             </a:fld>
             <a:endParaRPr lang="de-CH"/>
           </a:p>

</xml_diff>